<commit_message>
Uppdated red3, mine and pontus + plan
</commit_message>
<xml_diff>
--- a/reports/red3_grupp2.pptx
+++ b/reports/red3_grupp2.pptx
@@ -5,23 +5,25 @@
     <p:sldMasterId id="2147483648" r:id="rId1"/>
   </p:sldMasterIdLst>
   <p:notesMasterIdLst>
-    <p:notesMasterId r:id="rId11"/>
+    <p:notesMasterId r:id="rId13"/>
   </p:notesMasterIdLst>
   <p:sldIdLst>
     <p:sldId id="256" r:id="rId2"/>
     <p:sldId id="261" r:id="rId3"/>
     <p:sldId id="264" r:id="rId4"/>
     <p:sldId id="262" r:id="rId5"/>
-    <p:sldId id="265" r:id="rId6"/>
-    <p:sldId id="266" r:id="rId7"/>
-    <p:sldId id="267" r:id="rId8"/>
-    <p:sldId id="270" r:id="rId9"/>
-    <p:sldId id="263" r:id="rId10"/>
+    <p:sldId id="271" r:id="rId6"/>
+    <p:sldId id="265" r:id="rId7"/>
+    <p:sldId id="272" r:id="rId8"/>
+    <p:sldId id="266" r:id="rId9"/>
+    <p:sldId id="267" r:id="rId10"/>
+    <p:sldId id="270" r:id="rId11"/>
+    <p:sldId id="263" r:id="rId12"/>
   </p:sldIdLst>
   <p:sldSz cx="12192000" cy="6858000"/>
   <p:notesSz cx="6858000" cy="9144000"/>
   <p:custDataLst>
-    <p:tags r:id="rId12"/>
+    <p:tags r:id="rId14"/>
   </p:custDataLst>
   <p:defaultTextStyle>
     <a:defPPr>
@@ -514,7 +516,7 @@
           <a:p>
             <a:pPr lvl="0"/>
             <a:fld id="{465D8127-39A3-4811-B40C-4BB2AA95A186}" type="slidenum">
-              <a:t>6</a:t>
+              <a:t>8</a:t>
             </a:fld>
             <a:endParaRPr lang="sv-SE"/>
           </a:p>
@@ -616,7 +618,7 @@
           <a:p>
             <a:pPr lvl="0"/>
             <a:fld id="{C9F40FE3-77F9-42BD-957B-77EB91B54C0E}" type="slidenum">
-              <a:t>7</a:t>
+              <a:t>9</a:t>
             </a:fld>
             <a:endParaRPr lang="sv-SE"/>
           </a:p>
@@ -3685,571 +3687,7 @@
 </p:sld>
 </file>
 
-<file path=ppt/slides/slide2.xml><?xml version="1.0" encoding="utf-8"?>
-<p:sld xmlns:a="http://schemas.openxmlformats.org/drawingml/2006/main" xmlns:r="http://schemas.openxmlformats.org/officeDocument/2006/relationships" xmlns:p="http://schemas.openxmlformats.org/presentationml/2006/main">
-  <p:cSld>
-    <p:spTree>
-      <p:nvGrpSpPr>
-        <p:cNvPr id="1" name=""/>
-        <p:cNvGrpSpPr/>
-        <p:nvPr/>
-      </p:nvGrpSpPr>
-      <p:grpSpPr>
-        <a:xfrm>
-          <a:off x="0" y="0"/>
-          <a:ext cx="0" cy="0"/>
-          <a:chOff x="0" y="0"/>
-          <a:chExt cx="0" cy="0"/>
-        </a:xfrm>
-      </p:grpSpPr>
-      <p:sp>
-        <p:nvSpPr>
-          <p:cNvPr id="2" name="Rubrik 1"/>
-          <p:cNvSpPr>
-            <a:spLocks noGrp="1"/>
-          </p:cNvSpPr>
-          <p:nvPr>
-            <p:ph type="title"/>
-          </p:nvPr>
-        </p:nvSpPr>
-        <p:spPr/>
-        <p:txBody>
-          <a:bodyPr/>
-          <a:lstStyle/>
-          <a:p>
-            <a:r>
-              <a:rPr lang="sv-SE" dirty="0" smtClean="0"/>
-              <a:t>Planering från föregående redovisning</a:t>
-            </a:r>
-            <a:endParaRPr lang="sv-SE" dirty="0"/>
-          </a:p>
-        </p:txBody>
-      </p:sp>
-      <p:sp>
-        <p:nvSpPr>
-          <p:cNvPr id="3" name="Platshållare för innehåll 2"/>
-          <p:cNvSpPr>
-            <a:spLocks noGrp="1"/>
-          </p:cNvSpPr>
-          <p:nvPr>
-            <p:ph idx="1"/>
-          </p:nvPr>
-        </p:nvSpPr>
-        <p:spPr/>
-        <p:txBody>
-          <a:bodyPr/>
-          <a:lstStyle/>
-          <a:p>
-            <a:r>
-              <a:rPr lang="sv-SE" dirty="0"/>
-              <a:t>Skapa den nya strukturen för att testerna skall fungera hos alla</a:t>
-            </a:r>
-          </a:p>
-          <a:p>
-            <a:r>
-              <a:rPr lang="sv-SE" dirty="0"/>
-              <a:t>Klara med de kommandon och dess tester vi påbörjat och hittills planerat att implementera</a:t>
-            </a:r>
-          </a:p>
-          <a:p>
-            <a:r>
-              <a:rPr lang="sv-SE" dirty="0"/>
-              <a:t>Bestämma vad mer vi vill implementera</a:t>
-            </a:r>
-          </a:p>
-        </p:txBody>
-      </p:sp>
-    </p:spTree>
-    <p:custDataLst>
-      <p:tags r:id="rId1"/>
-    </p:custDataLst>
-    <p:extLst>
-      <p:ext uri="{BB962C8B-B14F-4D97-AF65-F5344CB8AC3E}">
-        <p14:creationId xmlns:p14="http://schemas.microsoft.com/office/powerpoint/2010/main" val="479925935"/>
-      </p:ext>
-    </p:extLst>
-  </p:cSld>
-  <p:clrMapOvr>
-    <a:masterClrMapping/>
-  </p:clrMapOvr>
-</p:sld>
-</file>
-
-<file path=ppt/slides/slide3.xml><?xml version="1.0" encoding="utf-8"?>
-<p:sld xmlns:a="http://schemas.openxmlformats.org/drawingml/2006/main" xmlns:r="http://schemas.openxmlformats.org/officeDocument/2006/relationships" xmlns:p="http://schemas.openxmlformats.org/presentationml/2006/main">
-  <p:cSld>
-    <p:spTree>
-      <p:nvGrpSpPr>
-        <p:cNvPr id="1" name=""/>
-        <p:cNvGrpSpPr/>
-        <p:nvPr/>
-      </p:nvGrpSpPr>
-      <p:grpSpPr>
-        <a:xfrm>
-          <a:off x="0" y="0"/>
-          <a:ext cx="0" cy="0"/>
-          <a:chOff x="0" y="0"/>
-          <a:chExt cx="0" cy="0"/>
-        </a:xfrm>
-      </p:grpSpPr>
-      <p:sp>
-        <p:nvSpPr>
-          <p:cNvPr id="2" name="Rubrik 1"/>
-          <p:cNvSpPr>
-            <a:spLocks noGrp="1"/>
-          </p:cNvSpPr>
-          <p:nvPr>
-            <p:ph type="title"/>
-          </p:nvPr>
-        </p:nvSpPr>
-        <p:spPr/>
-        <p:txBody>
-          <a:bodyPr/>
-          <a:lstStyle/>
-          <a:p>
-            <a:r>
-              <a:rPr lang="sv-SE" dirty="0" smtClean="0"/>
-              <a:t>Kommandon och funktioner</a:t>
-            </a:r>
-            <a:endParaRPr lang="sv-SE" dirty="0"/>
-          </a:p>
-        </p:txBody>
-      </p:sp>
-      <p:sp>
-        <p:nvSpPr>
-          <p:cNvPr id="4" name="Platshållare för innehåll 3"/>
-          <p:cNvSpPr>
-            <a:spLocks noGrp="1"/>
-          </p:cNvSpPr>
-          <p:nvPr>
-            <p:ph sz="half" idx="1"/>
-          </p:nvPr>
-        </p:nvSpPr>
-        <p:spPr>
-          <a:xfrm>
-            <a:off x="838199" y="1825625"/>
-            <a:ext cx="10349089" cy="4351338"/>
-          </a:xfrm>
-        </p:spPr>
-        <p:txBody>
-          <a:bodyPr/>
-          <a:lstStyle/>
-          <a:p>
-            <a:r>
-              <a:rPr lang="sv-SE" dirty="0" err="1" smtClean="0"/>
-              <a:t>CommandPrompt</a:t>
-            </a:r>
-            <a:r>
-              <a:rPr lang="sv-SE" dirty="0" smtClean="0"/>
-              <a:t>– Pontus, Nina</a:t>
-            </a:r>
-          </a:p>
-          <a:p>
-            <a:r>
-              <a:rPr lang="sv-SE" dirty="0" smtClean="0"/>
-              <a:t>cd – Annika</a:t>
-            </a:r>
-          </a:p>
-          <a:p>
-            <a:r>
-              <a:rPr lang="sv-SE" dirty="0" err="1" smtClean="0"/>
-              <a:t>pwd</a:t>
-            </a:r>
-            <a:r>
-              <a:rPr lang="sv-SE" dirty="0" smtClean="0"/>
-              <a:t> – Nina</a:t>
-            </a:r>
-          </a:p>
-          <a:p>
-            <a:r>
-              <a:rPr lang="sv-SE" dirty="0" smtClean="0"/>
-              <a:t>cp – Felix</a:t>
-            </a:r>
-          </a:p>
-          <a:p>
-            <a:r>
-              <a:rPr lang="sv-SE" dirty="0" err="1" smtClean="0"/>
-              <a:t>file</a:t>
-            </a:r>
-            <a:r>
-              <a:rPr lang="sv-SE" dirty="0" smtClean="0"/>
-              <a:t> - Victor</a:t>
-            </a:r>
-          </a:p>
-        </p:txBody>
-      </p:sp>
-    </p:spTree>
-    <p:custDataLst>
-      <p:tags r:id="rId1"/>
-    </p:custDataLst>
-    <p:extLst>
-      <p:ext uri="{BB962C8B-B14F-4D97-AF65-F5344CB8AC3E}">
-        <p14:creationId xmlns:p14="http://schemas.microsoft.com/office/powerpoint/2010/main" val="210395091"/>
-      </p:ext>
-    </p:extLst>
-  </p:cSld>
-  <p:clrMapOvr>
-    <a:masterClrMapping/>
-  </p:clrMapOvr>
-</p:sld>
-</file>
-
-<file path=ppt/slides/slide4.xml><?xml version="1.0" encoding="utf-8"?>
-<p:sld xmlns:a="http://schemas.openxmlformats.org/drawingml/2006/main" xmlns:r="http://schemas.openxmlformats.org/officeDocument/2006/relationships" xmlns:p="http://schemas.openxmlformats.org/presentationml/2006/main">
-  <p:cSld>
-    <p:spTree>
-      <p:nvGrpSpPr>
-        <p:cNvPr id="1" name=""/>
-        <p:cNvGrpSpPr/>
-        <p:nvPr/>
-      </p:nvGrpSpPr>
-      <p:grpSpPr>
-        <a:xfrm>
-          <a:off x="0" y="0"/>
-          <a:ext cx="0" cy="0"/>
-          <a:chOff x="0" y="0"/>
-          <a:chExt cx="0" cy="0"/>
-        </a:xfrm>
-      </p:grpSpPr>
-      <p:sp>
-        <p:nvSpPr>
-          <p:cNvPr id="2" name="Rubrik 1"/>
-          <p:cNvSpPr>
-            <a:spLocks noGrp="1"/>
-          </p:cNvSpPr>
-          <p:nvPr>
-            <p:ph type="title"/>
-          </p:nvPr>
-        </p:nvSpPr>
-        <p:spPr/>
-        <p:txBody>
-          <a:bodyPr/>
-          <a:lstStyle/>
-          <a:p>
-            <a:r>
-              <a:rPr lang="sv-SE" dirty="0" smtClean="0"/>
-              <a:t>Status: Nina Hedman</a:t>
-            </a:r>
-            <a:endParaRPr lang="sv-SE" dirty="0"/>
-          </a:p>
-        </p:txBody>
-      </p:sp>
-      <p:sp>
-        <p:nvSpPr>
-          <p:cNvPr id="3" name="Platshållare för innehåll 2"/>
-          <p:cNvSpPr>
-            <a:spLocks noGrp="1"/>
-          </p:cNvSpPr>
-          <p:nvPr>
-            <p:ph sz="half" idx="1"/>
-          </p:nvPr>
-        </p:nvSpPr>
-        <p:spPr>
-          <a:xfrm>
-            <a:off x="838200" y="1825625"/>
-            <a:ext cx="9649178" cy="4351338"/>
-          </a:xfrm>
-        </p:spPr>
-        <p:txBody>
-          <a:bodyPr/>
-          <a:lstStyle/>
-          <a:p>
-            <a:endParaRPr lang="sv-SE" dirty="0"/>
-          </a:p>
-        </p:txBody>
-      </p:sp>
-    </p:spTree>
-    <p:custDataLst>
-      <p:tags r:id="rId1"/>
-    </p:custDataLst>
-    <p:extLst>
-      <p:ext uri="{BB962C8B-B14F-4D97-AF65-F5344CB8AC3E}">
-        <p14:creationId xmlns:p14="http://schemas.microsoft.com/office/powerpoint/2010/main" val="2202977583"/>
-      </p:ext>
-    </p:extLst>
-  </p:cSld>
-  <p:clrMapOvr>
-    <a:masterClrMapping/>
-  </p:clrMapOvr>
-</p:sld>
-</file>
-
-<file path=ppt/slides/slide5.xml><?xml version="1.0" encoding="utf-8"?>
-<p:sld xmlns:a="http://schemas.openxmlformats.org/drawingml/2006/main" xmlns:r="http://schemas.openxmlformats.org/officeDocument/2006/relationships" xmlns:p="http://schemas.openxmlformats.org/presentationml/2006/main">
-  <p:cSld>
-    <p:spTree>
-      <p:nvGrpSpPr>
-        <p:cNvPr id="1" name=""/>
-        <p:cNvGrpSpPr/>
-        <p:nvPr/>
-      </p:nvGrpSpPr>
-      <p:grpSpPr>
-        <a:xfrm>
-          <a:off x="0" y="0"/>
-          <a:ext cx="0" cy="0"/>
-          <a:chOff x="0" y="0"/>
-          <a:chExt cx="0" cy="0"/>
-        </a:xfrm>
-      </p:grpSpPr>
-      <p:sp>
-        <p:nvSpPr>
-          <p:cNvPr id="2" name="Rubrik 1"/>
-          <p:cNvSpPr>
-            <a:spLocks noGrp="1"/>
-          </p:cNvSpPr>
-          <p:nvPr>
-            <p:ph type="title"/>
-          </p:nvPr>
-        </p:nvSpPr>
-        <p:spPr/>
-        <p:txBody>
-          <a:bodyPr/>
-          <a:lstStyle/>
-          <a:p>
-            <a:r>
-              <a:rPr lang="sv-SE" dirty="0" smtClean="0"/>
-              <a:t>Status: Pontus Sandliden</a:t>
-            </a:r>
-            <a:endParaRPr lang="sv-SE" dirty="0"/>
-          </a:p>
-        </p:txBody>
-      </p:sp>
-      <p:sp>
-        <p:nvSpPr>
-          <p:cNvPr id="3" name="Platshållare för innehåll 2"/>
-          <p:cNvSpPr>
-            <a:spLocks noGrp="1"/>
-          </p:cNvSpPr>
-          <p:nvPr>
-            <p:ph sz="half" idx="1"/>
-          </p:nvPr>
-        </p:nvSpPr>
-        <p:spPr>
-          <a:xfrm>
-            <a:off x="838200" y="1825625"/>
-            <a:ext cx="9649178" cy="4351338"/>
-          </a:xfrm>
-        </p:spPr>
-        <p:txBody>
-          <a:bodyPr/>
-          <a:lstStyle/>
-          <a:p>
-            <a:endParaRPr lang="sv-SE" dirty="0" smtClean="0"/>
-          </a:p>
-          <a:p>
-            <a:endParaRPr lang="sv-SE" dirty="0"/>
-          </a:p>
-        </p:txBody>
-      </p:sp>
-    </p:spTree>
-    <p:custDataLst>
-      <p:tags r:id="rId1"/>
-    </p:custDataLst>
-    <p:extLst>
-      <p:ext uri="{BB962C8B-B14F-4D97-AF65-F5344CB8AC3E}">
-        <p14:creationId xmlns:p14="http://schemas.microsoft.com/office/powerpoint/2010/main" val="2293218616"/>
-      </p:ext>
-    </p:extLst>
-  </p:cSld>
-  <p:clrMapOvr>
-    <a:masterClrMapping/>
-  </p:clrMapOvr>
-</p:sld>
-</file>
-
-<file path=ppt/slides/slide6.xml><?xml version="1.0" encoding="utf-8"?>
-<p:sld xmlns:a="http://schemas.openxmlformats.org/drawingml/2006/main" xmlns:r="http://schemas.openxmlformats.org/officeDocument/2006/relationships" xmlns:p="http://schemas.openxmlformats.org/presentationml/2006/main">
-  <p:cSld>
-    <p:spTree>
-      <p:nvGrpSpPr>
-        <p:cNvPr id="1" name=""/>
-        <p:cNvGrpSpPr/>
-        <p:nvPr/>
-      </p:nvGrpSpPr>
-      <p:grpSpPr>
-        <a:xfrm>
-          <a:off x="0" y="0"/>
-          <a:ext cx="0" cy="0"/>
-          <a:chOff x="0" y="0"/>
-          <a:chExt cx="0" cy="0"/>
-        </a:xfrm>
-      </p:grpSpPr>
-      <p:sp>
-        <p:nvSpPr>
-          <p:cNvPr id="2" name="Rubrik 1"/>
-          <p:cNvSpPr txBox="1">
-            <a:spLocks noGrp="1"/>
-          </p:cNvSpPr>
-          <p:nvPr>
-            <p:ph type="title" idx="4294967295"/>
-          </p:nvPr>
-        </p:nvSpPr>
-        <p:spPr/>
-        <p:txBody>
-          <a:bodyPr/>
-          <a:lstStyle/>
-          <a:p>
-            <a:pPr lvl="0"/>
-            <a:r>
-              <a:rPr lang="sv-SE" dirty="0"/>
-              <a:t>Status: </a:t>
-            </a:r>
-            <a:r>
-              <a:rPr lang="sv-SE" dirty="0" smtClean="0"/>
-              <a:t>Annika Svedin</a:t>
-            </a:r>
-            <a:endParaRPr lang="sv-SE" dirty="0"/>
-          </a:p>
-        </p:txBody>
-      </p:sp>
-      <p:sp>
-        <p:nvSpPr>
-          <p:cNvPr id="3" name="Platshållare för innehåll 2"/>
-          <p:cNvSpPr txBox="1">
-            <a:spLocks noGrp="1"/>
-          </p:cNvSpPr>
-          <p:nvPr>
-            <p:ph type="body" idx="4294967295"/>
-          </p:nvPr>
-        </p:nvSpPr>
-        <p:spPr>
-          <a:xfrm>
-            <a:off x="838200" y="1825625"/>
-            <a:ext cx="4769386" cy="4351338"/>
-          </a:xfrm>
-        </p:spPr>
-        <p:txBody>
-          <a:bodyPr/>
-          <a:lstStyle/>
-          <a:p>
-            <a:pPr lvl="0">
-              <a:spcBef>
-                <a:spcPts val="1001"/>
-              </a:spcBef>
-              <a:buClr>
-                <a:srgbClr val="000000"/>
-              </a:buClr>
-              <a:buSzPct val="100000"/>
-              <a:buFont typeface="Arial" pitchFamily="34"/>
-              <a:buChar char="•"/>
-            </a:pPr>
-            <a:endParaRPr lang="sv-SE" dirty="0"/>
-          </a:p>
-        </p:txBody>
-      </p:sp>
-    </p:spTree>
-    <p:extLst>
-      <p:ext uri="{BB962C8B-B14F-4D97-AF65-F5344CB8AC3E}">
-        <p14:creationId xmlns:p14="http://schemas.microsoft.com/office/powerpoint/2010/main" val="2275277750"/>
-      </p:ext>
-    </p:extLst>
-  </p:cSld>
-  <p:clrMapOvr>
-    <a:masterClrMapping/>
-  </p:clrMapOvr>
-  <mc:AlternateContent xmlns:mc="http://schemas.openxmlformats.org/markup-compatibility/2006" xmlns:p14="http://schemas.microsoft.com/office/powerpoint/2010/main">
-    <mc:Choice Requires="p14">
-      <p:transition spd="slow" p14:dur="2000"/>
-    </mc:Choice>
-    <mc:Fallback xmlns="">
-      <p:transition spd="slow"/>
-    </mc:Fallback>
-  </mc:AlternateContent>
-</p:sld>
-</file>
-
-<file path=ppt/slides/slide7.xml><?xml version="1.0" encoding="utf-8"?>
-<p:sld xmlns:a="http://schemas.openxmlformats.org/drawingml/2006/main" xmlns:r="http://schemas.openxmlformats.org/officeDocument/2006/relationships" xmlns:p="http://schemas.openxmlformats.org/presentationml/2006/main">
-  <p:cSld>
-    <p:spTree>
-      <p:nvGrpSpPr>
-        <p:cNvPr id="1" name=""/>
-        <p:cNvGrpSpPr/>
-        <p:nvPr/>
-      </p:nvGrpSpPr>
-      <p:grpSpPr>
-        <a:xfrm>
-          <a:off x="0" y="0"/>
-          <a:ext cx="0" cy="0"/>
-          <a:chOff x="0" y="0"/>
-          <a:chExt cx="0" cy="0"/>
-        </a:xfrm>
-      </p:grpSpPr>
-      <p:sp>
-        <p:nvSpPr>
-          <p:cNvPr id="2" name="Rubrik 1"/>
-          <p:cNvSpPr txBox="1">
-            <a:spLocks noGrp="1"/>
-          </p:cNvSpPr>
-          <p:nvPr>
-            <p:ph type="title" idx="4294967295"/>
-          </p:nvPr>
-        </p:nvSpPr>
-        <p:spPr/>
-        <p:txBody>
-          <a:bodyPr/>
-          <a:lstStyle/>
-          <a:p>
-            <a:pPr lvl="0"/>
-            <a:r>
-              <a:rPr lang="sv-SE" dirty="0"/>
-              <a:t>Status: </a:t>
-            </a:r>
-            <a:r>
-              <a:rPr lang="sv-SE" dirty="0" smtClean="0"/>
-              <a:t>Felix Thörnqvist</a:t>
-            </a:r>
-            <a:endParaRPr lang="sv-SE" dirty="0"/>
-          </a:p>
-        </p:txBody>
-      </p:sp>
-      <p:sp>
-        <p:nvSpPr>
-          <p:cNvPr id="3" name="Platshållare för innehåll 2"/>
-          <p:cNvSpPr txBox="1">
-            <a:spLocks noGrp="1"/>
-          </p:cNvSpPr>
-          <p:nvPr>
-            <p:ph type="body" idx="4294967295"/>
-          </p:nvPr>
-        </p:nvSpPr>
-        <p:spPr/>
-        <p:txBody>
-          <a:bodyPr/>
-          <a:lstStyle/>
-          <a:p>
-            <a:pPr lvl="0">
-              <a:spcBef>
-                <a:spcPts val="1001"/>
-              </a:spcBef>
-              <a:buNone/>
-            </a:pPr>
-            <a:endParaRPr lang="sv-SE" dirty="0"/>
-          </a:p>
-        </p:txBody>
-      </p:sp>
-    </p:spTree>
-    <p:extLst>
-      <p:ext uri="{BB962C8B-B14F-4D97-AF65-F5344CB8AC3E}">
-        <p14:creationId xmlns:p14="http://schemas.microsoft.com/office/powerpoint/2010/main" val="1988748492"/>
-      </p:ext>
-    </p:extLst>
-  </p:cSld>
-  <p:clrMapOvr>
-    <a:masterClrMapping/>
-  </p:clrMapOvr>
-  <mc:AlternateContent xmlns:mc="http://schemas.openxmlformats.org/markup-compatibility/2006" xmlns:p14="http://schemas.microsoft.com/office/powerpoint/2010/main">
-    <mc:Choice Requires="p14">
-      <p:transition spd="slow" p14:dur="2000"/>
-    </mc:Choice>
-    <mc:Fallback xmlns="">
-      <p:transition spd="slow"/>
-    </mc:Fallback>
-  </mc:AlternateContent>
-</p:sld>
-</file>
-
-<file path=ppt/slides/slide8.xml><?xml version="1.0" encoding="utf-8"?>
+<file path=ppt/slides/slide10.xml><?xml version="1.0" encoding="utf-8"?>
 <p:sld xmlns:a="http://schemas.openxmlformats.org/drawingml/2006/main" xmlns:r="http://schemas.openxmlformats.org/officeDocument/2006/relationships" xmlns:p="http://schemas.openxmlformats.org/presentationml/2006/main">
   <p:cSld>
     <p:spTree>
@@ -4451,6 +3889,993 @@
 </p:sld>
 </file>
 
+<file path=ppt/slides/slide11.xml><?xml version="1.0" encoding="utf-8"?>
+<p:sld xmlns:a="http://schemas.openxmlformats.org/drawingml/2006/main" xmlns:r="http://schemas.openxmlformats.org/officeDocument/2006/relationships" xmlns:p="http://schemas.openxmlformats.org/presentationml/2006/main">
+  <p:cSld>
+    <p:spTree>
+      <p:nvGrpSpPr>
+        <p:cNvPr id="1" name=""/>
+        <p:cNvGrpSpPr/>
+        <p:nvPr/>
+      </p:nvGrpSpPr>
+      <p:grpSpPr>
+        <a:xfrm>
+          <a:off x="0" y="0"/>
+          <a:ext cx="0" cy="0"/>
+          <a:chOff x="0" y="0"/>
+          <a:chExt cx="0" cy="0"/>
+        </a:xfrm>
+      </p:grpSpPr>
+      <p:sp>
+        <p:nvSpPr>
+          <p:cNvPr id="2" name="Rubrik 1"/>
+          <p:cNvSpPr>
+            <a:spLocks noGrp="1"/>
+          </p:cNvSpPr>
+          <p:nvPr>
+            <p:ph type="title"/>
+          </p:nvPr>
+        </p:nvSpPr>
+        <p:spPr/>
+        <p:txBody>
+          <a:bodyPr/>
+          <a:lstStyle/>
+          <a:p>
+            <a:r>
+              <a:rPr lang="sv-SE" dirty="0" smtClean="0"/>
+              <a:t>Planering</a:t>
+            </a:r>
+            <a:endParaRPr lang="sv-SE" dirty="0"/>
+          </a:p>
+        </p:txBody>
+      </p:sp>
+      <p:sp>
+        <p:nvSpPr>
+          <p:cNvPr id="3" name="Platshållare för innehåll 2"/>
+          <p:cNvSpPr>
+            <a:spLocks noGrp="1"/>
+          </p:cNvSpPr>
+          <p:nvPr>
+            <p:ph idx="1"/>
+          </p:nvPr>
+        </p:nvSpPr>
+        <p:spPr/>
+        <p:txBody>
+          <a:bodyPr/>
+          <a:lstStyle/>
+          <a:p>
+            <a:r>
+              <a:rPr lang="sv-SE" dirty="0" smtClean="0"/>
+              <a:t>Färdigställa strukturen </a:t>
+            </a:r>
+            <a:r>
+              <a:rPr lang="sv-SE" dirty="0"/>
+              <a:t>för att testerna skall fungera hos </a:t>
+            </a:r>
+            <a:r>
+              <a:rPr lang="sv-SE" dirty="0" smtClean="0"/>
+              <a:t>alla</a:t>
+            </a:r>
+          </a:p>
+          <a:p>
+            <a:r>
+              <a:rPr lang="sv-SE" dirty="0" smtClean="0"/>
+              <a:t>Kontroll av mappnamn</a:t>
+            </a:r>
+          </a:p>
+          <a:p>
+            <a:r>
+              <a:rPr lang="sv-SE" dirty="0" smtClean="0"/>
+              <a:t>Färdigställa !!</a:t>
+            </a:r>
+          </a:p>
+          <a:p>
+            <a:r>
+              <a:rPr lang="sv-SE" dirty="0" smtClean="0"/>
+              <a:t>Implementera !+</a:t>
+            </a:r>
+            <a:endParaRPr lang="sv-SE" dirty="0"/>
+          </a:p>
+        </p:txBody>
+      </p:sp>
+    </p:spTree>
+    <p:custDataLst>
+      <p:tags r:id="rId1"/>
+    </p:custDataLst>
+    <p:extLst>
+      <p:ext uri="{BB962C8B-B14F-4D97-AF65-F5344CB8AC3E}">
+        <p14:creationId xmlns:p14="http://schemas.microsoft.com/office/powerpoint/2010/main" val="3814519309"/>
+      </p:ext>
+    </p:extLst>
+  </p:cSld>
+  <p:clrMapOvr>
+    <a:masterClrMapping/>
+  </p:clrMapOvr>
+</p:sld>
+</file>
+
+<file path=ppt/slides/slide2.xml><?xml version="1.0" encoding="utf-8"?>
+<p:sld xmlns:a="http://schemas.openxmlformats.org/drawingml/2006/main" xmlns:r="http://schemas.openxmlformats.org/officeDocument/2006/relationships" xmlns:p="http://schemas.openxmlformats.org/presentationml/2006/main">
+  <p:cSld>
+    <p:spTree>
+      <p:nvGrpSpPr>
+        <p:cNvPr id="1" name=""/>
+        <p:cNvGrpSpPr/>
+        <p:nvPr/>
+      </p:nvGrpSpPr>
+      <p:grpSpPr>
+        <a:xfrm>
+          <a:off x="0" y="0"/>
+          <a:ext cx="0" cy="0"/>
+          <a:chOff x="0" y="0"/>
+          <a:chExt cx="0" cy="0"/>
+        </a:xfrm>
+      </p:grpSpPr>
+      <p:sp>
+        <p:nvSpPr>
+          <p:cNvPr id="2" name="Rubrik 1"/>
+          <p:cNvSpPr>
+            <a:spLocks noGrp="1"/>
+          </p:cNvSpPr>
+          <p:nvPr>
+            <p:ph type="title"/>
+          </p:nvPr>
+        </p:nvSpPr>
+        <p:spPr/>
+        <p:txBody>
+          <a:bodyPr/>
+          <a:lstStyle/>
+          <a:p>
+            <a:r>
+              <a:rPr lang="sv-SE" dirty="0" smtClean="0"/>
+              <a:t>Planering från föregående redovisning</a:t>
+            </a:r>
+            <a:endParaRPr lang="sv-SE" dirty="0"/>
+          </a:p>
+        </p:txBody>
+      </p:sp>
+      <p:sp>
+        <p:nvSpPr>
+          <p:cNvPr id="3" name="Platshållare för innehåll 2"/>
+          <p:cNvSpPr>
+            <a:spLocks noGrp="1"/>
+          </p:cNvSpPr>
+          <p:nvPr>
+            <p:ph idx="1"/>
+          </p:nvPr>
+        </p:nvSpPr>
+        <p:spPr/>
+        <p:txBody>
+          <a:bodyPr/>
+          <a:lstStyle/>
+          <a:p>
+            <a:r>
+              <a:rPr lang="sv-SE" dirty="0"/>
+              <a:t>Skapa den nya strukturen för att testerna skall fungera hos alla</a:t>
+            </a:r>
+          </a:p>
+          <a:p>
+            <a:r>
+              <a:rPr lang="sv-SE" dirty="0"/>
+              <a:t>Klara med de kommandon och dess tester vi påbörjat och hittills planerat att implementera</a:t>
+            </a:r>
+          </a:p>
+          <a:p>
+            <a:r>
+              <a:rPr lang="sv-SE" dirty="0"/>
+              <a:t>Bestämma vad mer vi vill implementera</a:t>
+            </a:r>
+          </a:p>
+        </p:txBody>
+      </p:sp>
+    </p:spTree>
+    <p:custDataLst>
+      <p:tags r:id="rId1"/>
+    </p:custDataLst>
+    <p:extLst>
+      <p:ext uri="{BB962C8B-B14F-4D97-AF65-F5344CB8AC3E}">
+        <p14:creationId xmlns:p14="http://schemas.microsoft.com/office/powerpoint/2010/main" val="479925935"/>
+      </p:ext>
+    </p:extLst>
+  </p:cSld>
+  <p:clrMapOvr>
+    <a:masterClrMapping/>
+  </p:clrMapOvr>
+</p:sld>
+</file>
+
+<file path=ppt/slides/slide3.xml><?xml version="1.0" encoding="utf-8"?>
+<p:sld xmlns:a="http://schemas.openxmlformats.org/drawingml/2006/main" xmlns:r="http://schemas.openxmlformats.org/officeDocument/2006/relationships" xmlns:p="http://schemas.openxmlformats.org/presentationml/2006/main">
+  <p:cSld>
+    <p:spTree>
+      <p:nvGrpSpPr>
+        <p:cNvPr id="1" name=""/>
+        <p:cNvGrpSpPr/>
+        <p:nvPr/>
+      </p:nvGrpSpPr>
+      <p:grpSpPr>
+        <a:xfrm>
+          <a:off x="0" y="0"/>
+          <a:ext cx="0" cy="0"/>
+          <a:chOff x="0" y="0"/>
+          <a:chExt cx="0" cy="0"/>
+        </a:xfrm>
+      </p:grpSpPr>
+      <p:sp>
+        <p:nvSpPr>
+          <p:cNvPr id="2" name="Rubrik 1"/>
+          <p:cNvSpPr>
+            <a:spLocks noGrp="1"/>
+          </p:cNvSpPr>
+          <p:nvPr>
+            <p:ph type="title"/>
+          </p:nvPr>
+        </p:nvSpPr>
+        <p:spPr/>
+        <p:txBody>
+          <a:bodyPr/>
+          <a:lstStyle/>
+          <a:p>
+            <a:r>
+              <a:rPr lang="sv-SE" dirty="0" smtClean="0"/>
+              <a:t>Kommandon och funktioner</a:t>
+            </a:r>
+            <a:endParaRPr lang="sv-SE" dirty="0"/>
+          </a:p>
+        </p:txBody>
+      </p:sp>
+      <p:sp>
+        <p:nvSpPr>
+          <p:cNvPr id="4" name="Platshållare för innehåll 3"/>
+          <p:cNvSpPr>
+            <a:spLocks noGrp="1"/>
+          </p:cNvSpPr>
+          <p:nvPr>
+            <p:ph sz="half" idx="1"/>
+          </p:nvPr>
+        </p:nvSpPr>
+        <p:spPr>
+          <a:xfrm>
+            <a:off x="838199" y="1825625"/>
+            <a:ext cx="10349089" cy="4351338"/>
+          </a:xfrm>
+        </p:spPr>
+        <p:txBody>
+          <a:bodyPr>
+            <a:normAutofit fontScale="85000" lnSpcReduction="20000"/>
+          </a:bodyPr>
+          <a:lstStyle/>
+          <a:p>
+            <a:r>
+              <a:rPr lang="sv-SE" dirty="0" smtClean="0"/>
+              <a:t>!! – Pontus</a:t>
+            </a:r>
+          </a:p>
+          <a:p>
+            <a:r>
+              <a:rPr lang="sv-SE" dirty="0" smtClean="0"/>
+              <a:t>!+ - Pontus, Nina</a:t>
+            </a:r>
+          </a:p>
+          <a:p>
+            <a:r>
+              <a:rPr lang="sv-SE" dirty="0" err="1"/>
+              <a:t>m</a:t>
+            </a:r>
+            <a:r>
+              <a:rPr lang="sv-SE" dirty="0" err="1" smtClean="0"/>
+              <a:t>f</a:t>
+            </a:r>
+            <a:r>
+              <a:rPr lang="sv-SE" dirty="0" smtClean="0"/>
+              <a:t> – Pontus, Nina</a:t>
+            </a:r>
+            <a:endParaRPr lang="sv-SE" dirty="0" smtClean="0"/>
+          </a:p>
+          <a:p>
+            <a:r>
+              <a:rPr lang="sv-SE" dirty="0" smtClean="0"/>
+              <a:t>cd – Annika</a:t>
+            </a:r>
+          </a:p>
+          <a:p>
+            <a:r>
+              <a:rPr lang="sv-SE" dirty="0" err="1" smtClean="0"/>
+              <a:t>pwd</a:t>
+            </a:r>
+            <a:r>
+              <a:rPr lang="sv-SE" dirty="0" smtClean="0"/>
+              <a:t> – Nina</a:t>
+            </a:r>
+          </a:p>
+          <a:p>
+            <a:r>
+              <a:rPr lang="sv-SE" dirty="0" smtClean="0"/>
+              <a:t>cp – Felix</a:t>
+            </a:r>
+          </a:p>
+          <a:p>
+            <a:r>
+              <a:rPr lang="sv-SE" dirty="0" err="1" smtClean="0"/>
+              <a:t>file</a:t>
+            </a:r>
+            <a:r>
+              <a:rPr lang="sv-SE" dirty="0" smtClean="0"/>
+              <a:t> </a:t>
+            </a:r>
+            <a:r>
+              <a:rPr lang="sv-SE" dirty="0" smtClean="0"/>
+              <a:t>– Victor</a:t>
+            </a:r>
+          </a:p>
+          <a:p>
+            <a:r>
+              <a:rPr lang="sv-SE" dirty="0" err="1" smtClean="0"/>
+              <a:t>ls</a:t>
+            </a:r>
+            <a:r>
+              <a:rPr lang="sv-SE" dirty="0" smtClean="0"/>
+              <a:t> - Victor</a:t>
+            </a:r>
+          </a:p>
+          <a:p>
+            <a:r>
+              <a:rPr lang="sv-SE" dirty="0"/>
+              <a:t>t</a:t>
+            </a:r>
+            <a:r>
+              <a:rPr lang="sv-SE" dirty="0" smtClean="0"/>
+              <a:t>ouch - Felix</a:t>
+            </a:r>
+          </a:p>
+          <a:p>
+            <a:r>
+              <a:rPr lang="sv-SE" dirty="0" err="1"/>
+              <a:t>f</a:t>
+            </a:r>
+            <a:r>
+              <a:rPr lang="sv-SE" dirty="0" err="1" smtClean="0"/>
+              <a:t>pad</a:t>
+            </a:r>
+            <a:r>
+              <a:rPr lang="sv-SE" dirty="0" smtClean="0"/>
+              <a:t> - Annika</a:t>
+            </a:r>
+          </a:p>
+          <a:p>
+            <a:r>
+              <a:rPr lang="sv-SE" dirty="0" err="1"/>
+              <a:t>m</a:t>
+            </a:r>
+            <a:r>
+              <a:rPr lang="sv-SE" dirty="0" err="1" smtClean="0"/>
+              <a:t>kdir</a:t>
+            </a:r>
+            <a:r>
+              <a:rPr lang="sv-SE" dirty="0" smtClean="0"/>
+              <a:t> - Pontus</a:t>
+            </a:r>
+          </a:p>
+          <a:p>
+            <a:endParaRPr lang="sv-SE" dirty="0" smtClean="0"/>
+          </a:p>
+          <a:p>
+            <a:endParaRPr lang="sv-SE" dirty="0" smtClean="0"/>
+          </a:p>
+        </p:txBody>
+      </p:sp>
+    </p:spTree>
+    <p:custDataLst>
+      <p:tags r:id="rId1"/>
+    </p:custDataLst>
+    <p:extLst>
+      <p:ext uri="{BB962C8B-B14F-4D97-AF65-F5344CB8AC3E}">
+        <p14:creationId xmlns:p14="http://schemas.microsoft.com/office/powerpoint/2010/main" val="210395091"/>
+      </p:ext>
+    </p:extLst>
+  </p:cSld>
+  <p:clrMapOvr>
+    <a:masterClrMapping/>
+  </p:clrMapOvr>
+</p:sld>
+</file>
+
+<file path=ppt/slides/slide4.xml><?xml version="1.0" encoding="utf-8"?>
+<p:sld xmlns:a="http://schemas.openxmlformats.org/drawingml/2006/main" xmlns:r="http://schemas.openxmlformats.org/officeDocument/2006/relationships" xmlns:p="http://schemas.openxmlformats.org/presentationml/2006/main">
+  <p:cSld>
+    <p:spTree>
+      <p:nvGrpSpPr>
+        <p:cNvPr id="1" name=""/>
+        <p:cNvGrpSpPr/>
+        <p:nvPr/>
+      </p:nvGrpSpPr>
+      <p:grpSpPr>
+        <a:xfrm>
+          <a:off x="0" y="0"/>
+          <a:ext cx="0" cy="0"/>
+          <a:chOff x="0" y="0"/>
+          <a:chExt cx="0" cy="0"/>
+        </a:xfrm>
+      </p:grpSpPr>
+      <p:sp>
+        <p:nvSpPr>
+          <p:cNvPr id="2" name="Rubrik 1"/>
+          <p:cNvSpPr>
+            <a:spLocks noGrp="1"/>
+          </p:cNvSpPr>
+          <p:nvPr>
+            <p:ph type="title"/>
+          </p:nvPr>
+        </p:nvSpPr>
+        <p:spPr>
+          <a:xfrm>
+            <a:off x="430576" y="343091"/>
+            <a:ext cx="10515600" cy="1325563"/>
+          </a:xfrm>
+        </p:spPr>
+        <p:txBody>
+          <a:bodyPr/>
+          <a:lstStyle/>
+          <a:p>
+            <a:r>
+              <a:rPr lang="sv-SE" dirty="0" smtClean="0"/>
+              <a:t>Status: Nina Hedman</a:t>
+            </a:r>
+            <a:endParaRPr lang="sv-SE" dirty="0"/>
+          </a:p>
+        </p:txBody>
+      </p:sp>
+      <p:sp>
+        <p:nvSpPr>
+          <p:cNvPr id="6" name="Content Placeholder 5"/>
+          <p:cNvSpPr>
+            <a:spLocks noGrp="1"/>
+          </p:cNvSpPr>
+          <p:nvPr>
+            <p:ph sz="half" idx="1"/>
+          </p:nvPr>
+        </p:nvSpPr>
+        <p:spPr>
+          <a:xfrm>
+            <a:off x="838199" y="1825625"/>
+            <a:ext cx="10630359" cy="4351338"/>
+          </a:xfrm>
+        </p:spPr>
+        <p:txBody>
+          <a:bodyPr/>
+          <a:lstStyle/>
+          <a:p>
+            <a:r>
+              <a:rPr lang="sv-SE" dirty="0" smtClean="0"/>
+              <a:t>Metod och tester för att kolla så att filnamnen är korrekt</a:t>
+            </a:r>
+          </a:p>
+          <a:p>
+            <a:pPr lvl="1"/>
+            <a:r>
+              <a:rPr lang="sv-SE" dirty="0" smtClean="0"/>
+              <a:t>ej mellanslag</a:t>
+            </a:r>
+          </a:p>
+          <a:p>
+            <a:pPr lvl="1"/>
+            <a:r>
+              <a:rPr lang="sv-SE" dirty="0" smtClean="0"/>
+              <a:t>filändelse .</a:t>
+            </a:r>
+            <a:r>
+              <a:rPr lang="sv-SE" dirty="0" err="1" smtClean="0"/>
+              <a:t>txt</a:t>
+            </a:r>
+            <a:endParaRPr lang="sv-SE" dirty="0"/>
+          </a:p>
+          <a:p>
+            <a:pPr lvl="1"/>
+            <a:r>
+              <a:rPr lang="sv-SE" dirty="0" smtClean="0"/>
+              <a:t>ogiltiga tecken)</a:t>
+            </a:r>
+          </a:p>
+          <a:p>
+            <a:r>
+              <a:rPr lang="sv-SE" dirty="0" err="1" smtClean="0"/>
+              <a:t>Refaktorering</a:t>
+            </a:r>
+            <a:r>
+              <a:rPr lang="sv-SE" dirty="0" smtClean="0"/>
+              <a:t> av metoden </a:t>
+            </a:r>
+            <a:r>
+              <a:rPr lang="sv-SE" dirty="0" err="1" smtClean="0"/>
+              <a:t>command</a:t>
+            </a:r>
+            <a:r>
+              <a:rPr lang="sv-SE" dirty="0" smtClean="0"/>
+              <a:t> i </a:t>
+            </a:r>
+            <a:r>
+              <a:rPr lang="sv-SE" dirty="0" err="1" smtClean="0"/>
+              <a:t>CommandPromt</a:t>
+            </a:r>
+            <a:r>
+              <a:rPr lang="sv-SE" dirty="0" smtClean="0"/>
+              <a:t> – riktiga kommandon</a:t>
+            </a:r>
+          </a:p>
+          <a:p>
+            <a:r>
+              <a:rPr lang="sv-SE" dirty="0" smtClean="0"/>
+              <a:t>@Before i </a:t>
+            </a:r>
+            <a:r>
+              <a:rPr lang="sv-SE" dirty="0" err="1" smtClean="0"/>
+              <a:t>CommandPromptTest</a:t>
+            </a:r>
+            <a:r>
+              <a:rPr lang="sv-SE" dirty="0" smtClean="0"/>
+              <a:t> och </a:t>
+            </a:r>
+            <a:r>
+              <a:rPr lang="sv-SE" dirty="0" err="1" smtClean="0"/>
+              <a:t>FileManager_InputControlTest</a:t>
+            </a:r>
+            <a:endParaRPr lang="sv-SE" dirty="0" smtClean="0"/>
+          </a:p>
+          <a:p>
+            <a:endParaRPr lang="sv-SE" dirty="0" smtClean="0"/>
+          </a:p>
+          <a:p>
+            <a:endParaRPr lang="sv-SE" dirty="0" smtClean="0"/>
+          </a:p>
+          <a:p>
+            <a:endParaRPr lang="sv-SE" dirty="0"/>
+          </a:p>
+        </p:txBody>
+      </p:sp>
+    </p:spTree>
+    <p:custDataLst>
+      <p:tags r:id="rId1"/>
+    </p:custDataLst>
+    <p:extLst>
+      <p:ext uri="{BB962C8B-B14F-4D97-AF65-F5344CB8AC3E}">
+        <p14:creationId xmlns:p14="http://schemas.microsoft.com/office/powerpoint/2010/main" val="2202977583"/>
+      </p:ext>
+    </p:extLst>
+  </p:cSld>
+  <p:clrMapOvr>
+    <a:masterClrMapping/>
+  </p:clrMapOvr>
+</p:sld>
+</file>
+
+<file path=ppt/slides/slide5.xml><?xml version="1.0" encoding="utf-8"?>
+<p:sld xmlns:a="http://schemas.openxmlformats.org/drawingml/2006/main" xmlns:r="http://schemas.openxmlformats.org/officeDocument/2006/relationships" xmlns:p="http://schemas.openxmlformats.org/presentationml/2006/main">
+  <p:cSld>
+    <p:spTree>
+      <p:nvGrpSpPr>
+        <p:cNvPr id="1" name=""/>
+        <p:cNvGrpSpPr/>
+        <p:nvPr/>
+      </p:nvGrpSpPr>
+      <p:grpSpPr>
+        <a:xfrm>
+          <a:off x="0" y="0"/>
+          <a:ext cx="0" cy="0"/>
+          <a:chOff x="0" y="0"/>
+          <a:chExt cx="0" cy="0"/>
+        </a:xfrm>
+      </p:grpSpPr>
+      <p:pic>
+        <p:nvPicPr>
+          <p:cNvPr id="6" name="Picture 5"/>
+          <p:cNvPicPr>
+            <a:picLocks noChangeAspect="1"/>
+          </p:cNvPicPr>
+          <p:nvPr/>
+        </p:nvPicPr>
+        <p:blipFill>
+          <a:blip r:embed="rId2"/>
+          <a:stretch>
+            <a:fillRect/>
+          </a:stretch>
+        </p:blipFill>
+        <p:spPr>
+          <a:xfrm>
+            <a:off x="6092328" y="104718"/>
+            <a:ext cx="5868316" cy="6329271"/>
+          </a:xfrm>
+          <a:prstGeom prst="rect">
+            <a:avLst/>
+          </a:prstGeom>
+        </p:spPr>
+      </p:pic>
+      <p:pic>
+        <p:nvPicPr>
+          <p:cNvPr id="8" name="Picture 7"/>
+          <p:cNvPicPr>
+            <a:picLocks noChangeAspect="1"/>
+          </p:cNvPicPr>
+          <p:nvPr/>
+        </p:nvPicPr>
+        <p:blipFill>
+          <a:blip r:embed="rId3"/>
+          <a:stretch>
+            <a:fillRect/>
+          </a:stretch>
+        </p:blipFill>
+        <p:spPr>
+          <a:xfrm>
+            <a:off x="143220" y="154376"/>
+            <a:ext cx="5869945" cy="6279613"/>
+          </a:xfrm>
+          <a:prstGeom prst="rect">
+            <a:avLst/>
+          </a:prstGeom>
+        </p:spPr>
+      </p:pic>
+    </p:spTree>
+    <p:extLst>
+      <p:ext uri="{BB962C8B-B14F-4D97-AF65-F5344CB8AC3E}">
+        <p14:creationId xmlns:p14="http://schemas.microsoft.com/office/powerpoint/2010/main" val="3970314399"/>
+      </p:ext>
+    </p:extLst>
+  </p:cSld>
+  <p:clrMapOvr>
+    <a:masterClrMapping/>
+  </p:clrMapOvr>
+</p:sld>
+</file>
+
+<file path=ppt/slides/slide6.xml><?xml version="1.0" encoding="utf-8"?>
+<p:sld xmlns:a="http://schemas.openxmlformats.org/drawingml/2006/main" xmlns:r="http://schemas.openxmlformats.org/officeDocument/2006/relationships" xmlns:p="http://schemas.openxmlformats.org/presentationml/2006/main">
+  <p:cSld>
+    <p:spTree>
+      <p:nvGrpSpPr>
+        <p:cNvPr id="1" name=""/>
+        <p:cNvGrpSpPr/>
+        <p:nvPr/>
+      </p:nvGrpSpPr>
+      <p:grpSpPr>
+        <a:xfrm>
+          <a:off x="0" y="0"/>
+          <a:ext cx="0" cy="0"/>
+          <a:chOff x="0" y="0"/>
+          <a:chExt cx="0" cy="0"/>
+        </a:xfrm>
+      </p:grpSpPr>
+      <p:sp>
+        <p:nvSpPr>
+          <p:cNvPr id="2" name="Rubrik 1"/>
+          <p:cNvSpPr>
+            <a:spLocks noGrp="1"/>
+          </p:cNvSpPr>
+          <p:nvPr>
+            <p:ph type="title"/>
+          </p:nvPr>
+        </p:nvSpPr>
+        <p:spPr/>
+        <p:txBody>
+          <a:bodyPr/>
+          <a:lstStyle/>
+          <a:p>
+            <a:r>
+              <a:rPr lang="sv-SE" dirty="0" smtClean="0"/>
+              <a:t>Status: Pontus Sandliden</a:t>
+            </a:r>
+            <a:endParaRPr lang="sv-SE" dirty="0"/>
+          </a:p>
+        </p:txBody>
+      </p:sp>
+      <p:sp>
+        <p:nvSpPr>
+          <p:cNvPr id="3" name="Platshållare för innehåll 2"/>
+          <p:cNvSpPr>
+            <a:spLocks noGrp="1"/>
+          </p:cNvSpPr>
+          <p:nvPr>
+            <p:ph sz="half" idx="1"/>
+          </p:nvPr>
+        </p:nvSpPr>
+        <p:spPr>
+          <a:xfrm>
+            <a:off x="838200" y="1792575"/>
+            <a:ext cx="9649178" cy="4351338"/>
+          </a:xfrm>
+        </p:spPr>
+        <p:txBody>
+          <a:bodyPr/>
+          <a:lstStyle/>
+          <a:p>
+            <a:endParaRPr lang="sv-SE" dirty="0" smtClean="0"/>
+          </a:p>
+          <a:p>
+            <a:endParaRPr lang="sv-SE" dirty="0"/>
+          </a:p>
+        </p:txBody>
+      </p:sp>
+      <p:sp>
+        <p:nvSpPr>
+          <p:cNvPr id="5" name="Content Placeholder 5"/>
+          <p:cNvSpPr>
+            <a:spLocks noGrp="1"/>
+          </p:cNvSpPr>
+          <p:nvPr>
+            <p:ph sz="half" idx="1"/>
+          </p:nvPr>
+        </p:nvSpPr>
+        <p:spPr>
+          <a:xfrm>
+            <a:off x="838199" y="1825625"/>
+            <a:ext cx="10630359" cy="4351338"/>
+          </a:xfrm>
+        </p:spPr>
+        <p:txBody>
+          <a:bodyPr/>
+          <a:lstStyle/>
+          <a:p>
+            <a:r>
+              <a:rPr lang="sv-SE" dirty="0" smtClean="0"/>
+              <a:t>Skapat metod för att skapa String av valfri längd som slutar på .</a:t>
+            </a:r>
+            <a:r>
+              <a:rPr lang="sv-SE" dirty="0" err="1" smtClean="0"/>
+              <a:t>txt</a:t>
+            </a:r>
+            <a:endParaRPr lang="sv-SE" dirty="0" smtClean="0"/>
+          </a:p>
+          <a:p>
+            <a:r>
+              <a:rPr lang="sv-SE" dirty="0" smtClean="0"/>
+              <a:t>Skapat tester för kontroll utav längden på filnamn</a:t>
+            </a:r>
+          </a:p>
+          <a:p>
+            <a:r>
+              <a:rPr lang="sv-SE" dirty="0" smtClean="0"/>
+              <a:t>Skapat kontroll för längd utav filnamn</a:t>
+            </a:r>
+          </a:p>
+          <a:p>
+            <a:r>
+              <a:rPr lang="sv-SE" dirty="0" err="1"/>
+              <a:t>Refaktorering</a:t>
+            </a:r>
+            <a:r>
+              <a:rPr lang="sv-SE" dirty="0"/>
+              <a:t> av metoden </a:t>
+            </a:r>
+            <a:r>
+              <a:rPr lang="sv-SE" dirty="0" err="1"/>
+              <a:t>command</a:t>
+            </a:r>
+            <a:r>
+              <a:rPr lang="sv-SE" dirty="0"/>
+              <a:t> i </a:t>
+            </a:r>
+            <a:r>
+              <a:rPr lang="sv-SE" dirty="0" err="1"/>
+              <a:t>CommandPromt</a:t>
+            </a:r>
+            <a:r>
+              <a:rPr lang="sv-SE" dirty="0"/>
+              <a:t> – riktiga kommandon</a:t>
+            </a:r>
+          </a:p>
+          <a:p>
+            <a:r>
+              <a:rPr lang="sv-SE" dirty="0" smtClean="0"/>
+              <a:t>Lagt till kommando för att få string utav 20 senast använda </a:t>
+            </a:r>
+            <a:r>
+              <a:rPr lang="sv-SE" dirty="0" err="1" smtClean="0"/>
+              <a:t>komandon</a:t>
+            </a:r>
+            <a:endParaRPr lang="sv-SE" dirty="0" smtClean="0"/>
+          </a:p>
+          <a:p>
+            <a:r>
+              <a:rPr lang="sv-SE" dirty="0" smtClean="0"/>
+              <a:t>Skapat tester för 20 senaste </a:t>
+            </a:r>
+            <a:r>
+              <a:rPr lang="sv-SE" dirty="0" err="1" smtClean="0"/>
+              <a:t>komandon</a:t>
+            </a:r>
+            <a:r>
+              <a:rPr lang="sv-SE" dirty="0" smtClean="0"/>
+              <a:t> </a:t>
+            </a:r>
+            <a:r>
+              <a:rPr lang="sv-SE" dirty="0" err="1" smtClean="0"/>
+              <a:t>komandot</a:t>
+            </a:r>
+            <a:endParaRPr lang="sv-SE" dirty="0" smtClean="0"/>
+          </a:p>
+          <a:p>
+            <a:endParaRPr lang="sv-SE" dirty="0" smtClean="0"/>
+          </a:p>
+          <a:p>
+            <a:endParaRPr lang="sv-SE" dirty="0" smtClean="0"/>
+          </a:p>
+          <a:p>
+            <a:endParaRPr lang="sv-SE" dirty="0" smtClean="0"/>
+          </a:p>
+          <a:p>
+            <a:endParaRPr lang="sv-SE" dirty="0"/>
+          </a:p>
+        </p:txBody>
+      </p:sp>
+    </p:spTree>
+    <p:custDataLst>
+      <p:tags r:id="rId1"/>
+    </p:custDataLst>
+    <p:extLst>
+      <p:ext uri="{BB962C8B-B14F-4D97-AF65-F5344CB8AC3E}">
+        <p14:creationId xmlns:p14="http://schemas.microsoft.com/office/powerpoint/2010/main" val="2293218616"/>
+      </p:ext>
+    </p:extLst>
+  </p:cSld>
+  <p:clrMapOvr>
+    <a:masterClrMapping/>
+  </p:clrMapOvr>
+</p:sld>
+</file>
+
+<file path=ppt/slides/slide7.xml><?xml version="1.0" encoding="utf-8"?>
+<p:sld xmlns:a="http://schemas.openxmlformats.org/drawingml/2006/main" xmlns:r="http://schemas.openxmlformats.org/officeDocument/2006/relationships" xmlns:p="http://schemas.openxmlformats.org/presentationml/2006/main">
+  <p:cSld>
+    <p:spTree>
+      <p:nvGrpSpPr>
+        <p:cNvPr id="1" name=""/>
+        <p:cNvGrpSpPr/>
+        <p:nvPr/>
+      </p:nvGrpSpPr>
+      <p:grpSpPr>
+        <a:xfrm>
+          <a:off x="0" y="0"/>
+          <a:ext cx="0" cy="0"/>
+          <a:chOff x="0" y="0"/>
+          <a:chExt cx="0" cy="0"/>
+        </a:xfrm>
+      </p:grpSpPr>
+      <p:pic>
+        <p:nvPicPr>
+          <p:cNvPr id="5" name="Picture 4"/>
+          <p:cNvPicPr>
+            <a:picLocks noChangeAspect="1"/>
+          </p:cNvPicPr>
+          <p:nvPr/>
+        </p:nvPicPr>
+        <p:blipFill>
+          <a:blip r:embed="rId2"/>
+          <a:stretch>
+            <a:fillRect/>
+          </a:stretch>
+        </p:blipFill>
+        <p:spPr>
+          <a:xfrm>
+            <a:off x="205042" y="110169"/>
+            <a:ext cx="6161272" cy="6373085"/>
+          </a:xfrm>
+          <a:prstGeom prst="rect">
+            <a:avLst/>
+          </a:prstGeom>
+        </p:spPr>
+      </p:pic>
+    </p:spTree>
+    <p:extLst>
+      <p:ext uri="{BB962C8B-B14F-4D97-AF65-F5344CB8AC3E}">
+        <p14:creationId xmlns:p14="http://schemas.microsoft.com/office/powerpoint/2010/main" val="3146885448"/>
+      </p:ext>
+    </p:extLst>
+  </p:cSld>
+  <p:clrMapOvr>
+    <a:masterClrMapping/>
+  </p:clrMapOvr>
+</p:sld>
+</file>
+
+<file path=ppt/slides/slide8.xml><?xml version="1.0" encoding="utf-8"?>
+<p:sld xmlns:a="http://schemas.openxmlformats.org/drawingml/2006/main" xmlns:r="http://schemas.openxmlformats.org/officeDocument/2006/relationships" xmlns:p="http://schemas.openxmlformats.org/presentationml/2006/main">
+  <p:cSld>
+    <p:spTree>
+      <p:nvGrpSpPr>
+        <p:cNvPr id="1" name=""/>
+        <p:cNvGrpSpPr/>
+        <p:nvPr/>
+      </p:nvGrpSpPr>
+      <p:grpSpPr>
+        <a:xfrm>
+          <a:off x="0" y="0"/>
+          <a:ext cx="0" cy="0"/>
+          <a:chOff x="0" y="0"/>
+          <a:chExt cx="0" cy="0"/>
+        </a:xfrm>
+      </p:grpSpPr>
+      <p:sp>
+        <p:nvSpPr>
+          <p:cNvPr id="2" name="Rubrik 1"/>
+          <p:cNvSpPr txBox="1">
+            <a:spLocks noGrp="1"/>
+          </p:cNvSpPr>
+          <p:nvPr>
+            <p:ph type="title" idx="4294967295"/>
+          </p:nvPr>
+        </p:nvSpPr>
+        <p:spPr/>
+        <p:txBody>
+          <a:bodyPr/>
+          <a:lstStyle/>
+          <a:p>
+            <a:pPr lvl="0"/>
+            <a:r>
+              <a:rPr lang="sv-SE" dirty="0"/>
+              <a:t>Status: </a:t>
+            </a:r>
+            <a:r>
+              <a:rPr lang="sv-SE" dirty="0" smtClean="0"/>
+              <a:t>Annika Svedin</a:t>
+            </a:r>
+            <a:endParaRPr lang="sv-SE" dirty="0"/>
+          </a:p>
+        </p:txBody>
+      </p:sp>
+      <p:sp>
+        <p:nvSpPr>
+          <p:cNvPr id="3" name="Platshållare för innehåll 2"/>
+          <p:cNvSpPr txBox="1">
+            <a:spLocks noGrp="1"/>
+          </p:cNvSpPr>
+          <p:nvPr>
+            <p:ph type="body" idx="4294967295"/>
+          </p:nvPr>
+        </p:nvSpPr>
+        <p:spPr>
+          <a:xfrm>
+            <a:off x="838200" y="1825625"/>
+            <a:ext cx="4769386" cy="4351338"/>
+          </a:xfrm>
+        </p:spPr>
+        <p:txBody>
+          <a:bodyPr/>
+          <a:lstStyle/>
+          <a:p>
+            <a:pPr lvl="0">
+              <a:spcBef>
+                <a:spcPts val="1001"/>
+              </a:spcBef>
+              <a:buClr>
+                <a:srgbClr val="000000"/>
+              </a:buClr>
+              <a:buSzPct val="100000"/>
+              <a:buFont typeface="Arial" pitchFamily="34"/>
+              <a:buChar char="•"/>
+            </a:pPr>
+            <a:endParaRPr lang="sv-SE" dirty="0"/>
+          </a:p>
+        </p:txBody>
+      </p:sp>
+    </p:spTree>
+    <p:extLst>
+      <p:ext uri="{BB962C8B-B14F-4D97-AF65-F5344CB8AC3E}">
+        <p14:creationId xmlns:p14="http://schemas.microsoft.com/office/powerpoint/2010/main" val="2275277750"/>
+      </p:ext>
+    </p:extLst>
+  </p:cSld>
+  <p:clrMapOvr>
+    <a:masterClrMapping/>
+  </p:clrMapOvr>
+  <mc:AlternateContent xmlns:mc="http://schemas.openxmlformats.org/markup-compatibility/2006" xmlns:p14="http://schemas.microsoft.com/office/powerpoint/2010/main">
+    <mc:Choice Requires="p14">
+      <p:transition spd="slow" p14:dur="2000"/>
+    </mc:Choice>
+    <mc:Fallback xmlns="">
+      <p:transition spd="slow"/>
+    </mc:Fallback>
+  </mc:AlternateContent>
+</p:sld>
+</file>
+
 <file path=ppt/slides/slide9.xml><?xml version="1.0" encoding="utf-8"?>
 <p:sld xmlns:a="http://schemas.openxmlformats.org/drawingml/2006/main" xmlns:r="http://schemas.openxmlformats.org/officeDocument/2006/relationships" xmlns:p="http://schemas.openxmlformats.org/presentationml/2006/main">
   <p:cSld>
@@ -4471,11 +4896,11 @@
       <p:sp>
         <p:nvSpPr>
           <p:cNvPr id="2" name="Rubrik 1"/>
-          <p:cNvSpPr>
-            <a:spLocks noGrp="1"/>
-          </p:cNvSpPr>
-          <p:nvPr>
-            <p:ph type="title"/>
+          <p:cNvSpPr txBox="1">
+            <a:spLocks noGrp="1"/>
+          </p:cNvSpPr>
+          <p:nvPr>
+            <p:ph type="title" idx="4294967295"/>
           </p:nvPr>
         </p:nvSpPr>
         <p:spPr/>
@@ -4483,9 +4908,14 @@
           <a:bodyPr/>
           <a:lstStyle/>
           <a:p>
+            <a:pPr lvl="0"/>
+            <a:r>
+              <a:rPr lang="sv-SE" dirty="0"/>
+              <a:t>Status: </a:t>
+            </a:r>
             <a:r>
               <a:rPr lang="sv-SE" dirty="0" smtClean="0"/>
-              <a:t>Planering</a:t>
+              <a:t>Felix Thörnqvist</a:t>
             </a:r>
             <a:endParaRPr lang="sv-SE" dirty="0"/>
           </a:p>
@@ -4494,11 +4924,11 @@
       <p:sp>
         <p:nvSpPr>
           <p:cNvPr id="3" name="Platshållare för innehåll 2"/>
-          <p:cNvSpPr>
-            <a:spLocks noGrp="1"/>
-          </p:cNvSpPr>
-          <p:nvPr>
-            <p:ph idx="1"/>
+          <p:cNvSpPr txBox="1">
+            <a:spLocks noGrp="1"/>
+          </p:cNvSpPr>
+          <p:nvPr>
+            <p:ph type="body" idx="4294967295"/>
           </p:nvPr>
         </p:nvSpPr>
         <p:spPr/>
@@ -4506,23 +4936,34 @@
           <a:bodyPr/>
           <a:lstStyle/>
           <a:p>
-            <a:endParaRPr lang="sv-SE" dirty="0" smtClean="0"/>
+            <a:pPr lvl="0">
+              <a:spcBef>
+                <a:spcPts val="1001"/>
+              </a:spcBef>
+              <a:buNone/>
+            </a:pPr>
+            <a:endParaRPr lang="sv-SE" dirty="0"/>
           </a:p>
         </p:txBody>
       </p:sp>
     </p:spTree>
-    <p:custDataLst>
-      <p:tags r:id="rId1"/>
-    </p:custDataLst>
     <p:extLst>
       <p:ext uri="{BB962C8B-B14F-4D97-AF65-F5344CB8AC3E}">
-        <p14:creationId xmlns:p14="http://schemas.microsoft.com/office/powerpoint/2010/main" val="3814519309"/>
+        <p14:creationId xmlns:p14="http://schemas.microsoft.com/office/powerpoint/2010/main" val="1988748492"/>
       </p:ext>
     </p:extLst>
   </p:cSld>
   <p:clrMapOvr>
     <a:masterClrMapping/>
   </p:clrMapOvr>
+  <mc:AlternateContent xmlns:mc="http://schemas.openxmlformats.org/markup-compatibility/2006" xmlns:p14="http://schemas.microsoft.com/office/powerpoint/2010/main">
+    <mc:Choice Requires="p14">
+      <p:transition spd="slow" p14:dur="2000"/>
+    </mc:Choice>
+    <mc:Fallback xmlns="">
+      <p:transition spd="slow"/>
+    </mc:Fallback>
+  </mc:AlternateContent>
 </p:sld>
 </file>
 

</xml_diff>